<commit_message>
updates to file management lecture
</commit_message>
<xml_diff>
--- a/file_management.pptx
+++ b/file_management.pptx
@@ -26,7 +26,7 @@
     <p:sldId id="275" r:id="rId17"/>
     <p:sldId id="273" r:id="rId18"/>
     <p:sldId id="293" r:id="rId19"/>
-    <p:sldId id="274" r:id="rId20"/>
+    <p:sldId id="294" r:id="rId20"/>
   </p:sldIdLst>
   <p:sldSz cx="9144000" cy="6858000" type="screen4x3"/>
   <p:notesSz cx="6858000" cy="9144000"/>
@@ -127,7 +127,7 @@
   </p:defaultTextStyle>
   <p:extLst>
     <p:ext uri="{EFAFB233-063F-42B5-8137-9DF3F51BA10A}">
-      <p15:sldGuideLst xmlns:p15="http://schemas.microsoft.com/office/powerpoint/2012/main" xmlns="">
+      <p15:sldGuideLst xmlns:p15="http://schemas.microsoft.com/office/powerpoint/2012/main">
         <p15:guide id="1" orient="horz" pos="2160">
           <p15:clr>
             <a:srgbClr val="A4A3A4"/>
@@ -226,7 +226,7 @@
           <a:p>
             <a:fld id="{51692F88-D5C3-BB44-8F9F-C03624D04443}" type="datetimeFigureOut">
               <a:rPr lang="en-US" smtClean="0"/>
-              <a:t>28/11/19</a:t>
+              <a:t>11/30/20</a:t>
             </a:fld>
             <a:endParaRPr lang="en-US"/>
           </a:p>
@@ -2366,160 +2366,6 @@
 </p:notes>
 </file>
 
-<file path=ppt/notesSlides/notesSlide18.xml><?xml version="1.0" encoding="utf-8"?>
-<p:notes xmlns:a="http://schemas.openxmlformats.org/drawingml/2006/main" xmlns:r="http://schemas.openxmlformats.org/officeDocument/2006/relationships" xmlns:p="http://schemas.openxmlformats.org/presentationml/2006/main">
-  <p:cSld>
-    <p:spTree>
-      <p:nvGrpSpPr>
-        <p:cNvPr id="1" name=""/>
-        <p:cNvGrpSpPr/>
-        <p:nvPr/>
-      </p:nvGrpSpPr>
-      <p:grpSpPr>
-        <a:xfrm>
-          <a:off x="0" y="0"/>
-          <a:ext cx="0" cy="0"/>
-          <a:chOff x="0" y="0"/>
-          <a:chExt cx="0" cy="0"/>
-        </a:xfrm>
-      </p:grpSpPr>
-      <p:sp>
-        <p:nvSpPr>
-          <p:cNvPr id="2" name="Slide Image Placeholder 1"/>
-          <p:cNvSpPr>
-            <a:spLocks noGrp="1" noRot="1" noChangeAspect="1"/>
-          </p:cNvSpPr>
-          <p:nvPr>
-            <p:ph type="sldImg"/>
-          </p:nvPr>
-        </p:nvSpPr>
-        <p:spPr/>
-      </p:sp>
-      <p:sp>
-        <p:nvSpPr>
-          <p:cNvPr id="3" name="Notes Placeholder 2"/>
-          <p:cNvSpPr>
-            <a:spLocks noGrp="1"/>
-          </p:cNvSpPr>
-          <p:nvPr>
-            <p:ph type="body" idx="1"/>
-          </p:nvPr>
-        </p:nvSpPr>
-        <p:spPr/>
-        <p:txBody>
-          <a:bodyPr/>
-          <a:lstStyle/>
-          <a:p>
-            <a:r>
-              <a:rPr lang="en-US" dirty="0"/>
-              <a:t>Why file organization of your research data is important</a:t>
-            </a:r>
-          </a:p>
-          <a:p>
-            <a:r>
-              <a:rPr lang="en-US" dirty="0"/>
-              <a:t>Specific techniques for organizing your research data,</a:t>
-            </a:r>
-          </a:p>
-          <a:p>
-            <a:r>
-              <a:rPr lang="en-US" dirty="0"/>
-              <a:t>including developing plans for:</a:t>
-            </a:r>
-          </a:p>
-          <a:p>
-            <a:r>
-              <a:rPr lang="en-US" dirty="0"/>
-              <a:t>– File structures - where to put data so you won’t lose it</a:t>
-            </a:r>
-          </a:p>
-          <a:p>
-            <a:r>
-              <a:rPr lang="en-US" dirty="0"/>
-              <a:t>(including tips on embedding </a:t>
-            </a:r>
-            <a:r>
-              <a:rPr lang="en-US" u="sng" dirty="0"/>
-              <a:t>metadata)</a:t>
-            </a:r>
-          </a:p>
-          <a:p>
-            <a:r>
-              <a:rPr lang="en-US" dirty="0"/>
-              <a:t>– File naming - what to call data so you know what it is</a:t>
-            </a:r>
-          </a:p>
-          <a:p>
-            <a:r>
-              <a:rPr lang="en-US" dirty="0"/>
-              <a:t>– A bit on version control - keeping track of data</a:t>
-            </a:r>
-          </a:p>
-          <a:p>
-            <a:r>
-              <a:rPr lang="en-US" dirty="0"/>
-              <a:t>• Will also include opportunities for:</a:t>
-            </a:r>
-          </a:p>
-          <a:p>
-            <a:r>
-              <a:rPr lang="en-US" dirty="0"/>
-              <a:t>– Small group discussion</a:t>
-            </a:r>
-          </a:p>
-          <a:p>
-            <a:r>
-              <a:rPr lang="en-US" dirty="0"/>
-              <a:t>– Exercise for organizing your own data</a:t>
-            </a:r>
-          </a:p>
-          <a:p>
-            <a:r>
-              <a:rPr lang="en-US" dirty="0"/>
-              <a:t>• Focuses on research data, but applies to other types of files as well</a:t>
-            </a:r>
-          </a:p>
-          <a:p>
-            <a:endParaRPr lang="en-US" dirty="0"/>
-          </a:p>
-        </p:txBody>
-      </p:sp>
-      <p:sp>
-        <p:nvSpPr>
-          <p:cNvPr id="4" name="Slide Number Placeholder 3"/>
-          <p:cNvSpPr>
-            <a:spLocks noGrp="1"/>
-          </p:cNvSpPr>
-          <p:nvPr>
-            <p:ph type="sldNum" sz="quarter" idx="10"/>
-          </p:nvPr>
-        </p:nvSpPr>
-        <p:spPr/>
-        <p:txBody>
-          <a:bodyPr/>
-          <a:lstStyle/>
-          <a:p>
-            <a:fld id="{B4AC918C-6F91-DF42-885D-FB52621DA1E3}" type="slidenum">
-              <a:rPr lang="en-US" smtClean="0"/>
-              <a:t>19</a:t>
-            </a:fld>
-            <a:endParaRPr lang="en-US"/>
-          </a:p>
-        </p:txBody>
-      </p:sp>
-    </p:spTree>
-    <p:extLst>
-      <p:ext uri="{BB962C8B-B14F-4D97-AF65-F5344CB8AC3E}">
-        <p14:creationId xmlns:p14="http://schemas.microsoft.com/office/powerpoint/2010/main" val="901667478"/>
-      </p:ext>
-    </p:extLst>
-  </p:cSld>
-  <p:clrMapOvr>
-    <a:masterClrMapping/>
-  </p:clrMapOvr>
-</p:notes>
-</file>
-
 <file path=ppt/notesSlides/notesSlide2.xml><?xml version="1.0" encoding="utf-8"?>
 <p:notes xmlns:a="http://schemas.openxmlformats.org/drawingml/2006/main" xmlns:r="http://schemas.openxmlformats.org/officeDocument/2006/relationships" xmlns:p="http://schemas.openxmlformats.org/presentationml/2006/main">
   <p:cSld>
@@ -4034,7 +3880,7 @@
           <a:p>
             <a:fld id="{346017C1-C055-114C-B2C2-19CD44202EC9}" type="datetimeFigureOut">
               <a:rPr lang="en-US" smtClean="0"/>
-              <a:t>28/11/19</a:t>
+              <a:t>11/30/20</a:t>
             </a:fld>
             <a:endParaRPr lang="en-US"/>
           </a:p>
@@ -4204,7 +4050,7 @@
           <a:p>
             <a:fld id="{346017C1-C055-114C-B2C2-19CD44202EC9}" type="datetimeFigureOut">
               <a:rPr lang="en-US" smtClean="0"/>
-              <a:t>28/11/19</a:t>
+              <a:t>11/30/20</a:t>
             </a:fld>
             <a:endParaRPr lang="en-US"/>
           </a:p>
@@ -4384,7 +4230,7 @@
           <a:p>
             <a:fld id="{346017C1-C055-114C-B2C2-19CD44202EC9}" type="datetimeFigureOut">
               <a:rPr lang="en-US" smtClean="0"/>
-              <a:t>28/11/19</a:t>
+              <a:t>11/30/20</a:t>
             </a:fld>
             <a:endParaRPr lang="en-US"/>
           </a:p>
@@ -4554,7 +4400,7 @@
           <a:p>
             <a:fld id="{346017C1-C055-114C-B2C2-19CD44202EC9}" type="datetimeFigureOut">
               <a:rPr lang="en-US" smtClean="0"/>
-              <a:t>28/11/19</a:t>
+              <a:t>11/30/20</a:t>
             </a:fld>
             <a:endParaRPr lang="en-US"/>
           </a:p>
@@ -4800,7 +4646,7 @@
           <a:p>
             <a:fld id="{346017C1-C055-114C-B2C2-19CD44202EC9}" type="datetimeFigureOut">
               <a:rPr lang="en-US" smtClean="0"/>
-              <a:t>28/11/19</a:t>
+              <a:t>11/30/20</a:t>
             </a:fld>
             <a:endParaRPr lang="en-US"/>
           </a:p>
@@ -5088,7 +4934,7 @@
           <a:p>
             <a:fld id="{346017C1-C055-114C-B2C2-19CD44202EC9}" type="datetimeFigureOut">
               <a:rPr lang="en-US" smtClean="0"/>
-              <a:t>28/11/19</a:t>
+              <a:t>11/30/20</a:t>
             </a:fld>
             <a:endParaRPr lang="en-US"/>
           </a:p>
@@ -5510,7 +5356,7 @@
           <a:p>
             <a:fld id="{346017C1-C055-114C-B2C2-19CD44202EC9}" type="datetimeFigureOut">
               <a:rPr lang="en-US" smtClean="0"/>
-              <a:t>28/11/19</a:t>
+              <a:t>11/30/20</a:t>
             </a:fld>
             <a:endParaRPr lang="en-US"/>
           </a:p>
@@ -5628,7 +5474,7 @@
           <a:p>
             <a:fld id="{346017C1-C055-114C-B2C2-19CD44202EC9}" type="datetimeFigureOut">
               <a:rPr lang="en-US" smtClean="0"/>
-              <a:t>28/11/19</a:t>
+              <a:t>11/30/20</a:t>
             </a:fld>
             <a:endParaRPr lang="en-US"/>
           </a:p>
@@ -5723,7 +5569,7 @@
           <a:p>
             <a:fld id="{346017C1-C055-114C-B2C2-19CD44202EC9}" type="datetimeFigureOut">
               <a:rPr lang="en-US" smtClean="0"/>
-              <a:t>28/11/19</a:t>
+              <a:t>11/30/20</a:t>
             </a:fld>
             <a:endParaRPr lang="en-US"/>
           </a:p>
@@ -6000,7 +5846,7 @@
           <a:p>
             <a:fld id="{346017C1-C055-114C-B2C2-19CD44202EC9}" type="datetimeFigureOut">
               <a:rPr lang="en-US" smtClean="0"/>
-              <a:t>28/11/19</a:t>
+              <a:t>11/30/20</a:t>
             </a:fld>
             <a:endParaRPr lang="en-US"/>
           </a:p>
@@ -6253,7 +6099,7 @@
           <a:p>
             <a:fld id="{346017C1-C055-114C-B2C2-19CD44202EC9}" type="datetimeFigureOut">
               <a:rPr lang="en-US" smtClean="0"/>
-              <a:t>28/11/19</a:t>
+              <a:t>11/30/20</a:t>
             </a:fld>
             <a:endParaRPr lang="en-US"/>
           </a:p>
@@ -6466,7 +6312,7 @@
           <a:p>
             <a:fld id="{346017C1-C055-114C-B2C2-19CD44202EC9}" type="datetimeFigureOut">
               <a:rPr lang="en-US" smtClean="0"/>
-              <a:t>28/11/19</a:t>
+              <a:t>11/30/20</a:t>
             </a:fld>
             <a:endParaRPr lang="en-US"/>
           </a:p>
@@ -6903,7 +6749,7 @@
           <a:p>
             <a:pPr algn="r"/>
             <a:r>
-              <a:rPr lang="en-US" sz="2000" dirty="0" smtClean="0"/>
+              <a:rPr lang="en-US" sz="2000" dirty="0"/>
               <a:t>Based on Slides by Jing Su</a:t>
             </a:r>
             <a:endParaRPr lang="en-US" sz="1600" dirty="0"/>
@@ -6920,13 +6766,6 @@
   <p:clrMapOvr>
     <a:masterClrMapping/>
   </p:clrMapOvr>
-  <p:timing>
-    <p:tnLst>
-      <p:par>
-        <p:cTn xmlns:p14="http://schemas.microsoft.com/office/powerpoint/2010/main" id="1" dur="indefinite" restart="never" nodeType="tmRoot"/>
-      </p:par>
-    </p:tnLst>
-  </p:timing>
 </p:sld>
 </file>
 
@@ -7123,13 +6962,8 @@
           <a:p>
             <a:r>
               <a:rPr lang="en-US" sz="2400" dirty="0"/>
-              <a:t>File names should be short enough to be readable, while still conveying enough pertinent </a:t>
-            </a:r>
-            <a:r>
-              <a:rPr lang="en-US" sz="2400" dirty="0" smtClean="0"/>
-              <a:t>information</a:t>
-            </a:r>
-            <a:endParaRPr lang="en-US" sz="2400" dirty="0"/>
+              <a:t>File names should be short enough to be readable, while still conveying enough pertinent information</a:t>
+            </a:r>
           </a:p>
           <a:p>
             <a:pPr marL="0" indent="0">
@@ -7153,13 +6987,6 @@
   <p:clrMapOvr>
     <a:masterClrMapping/>
   </p:clrMapOvr>
-  <p:timing>
-    <p:tnLst>
-      <p:par>
-        <p:cTn xmlns:p14="http://schemas.microsoft.com/office/powerpoint/2010/main" id="1" dur="indefinite" restart="never" nodeType="tmRoot"/>
-      </p:par>
-    </p:tnLst>
-  </p:timing>
 </p:sld>
 </file>
 
@@ -7519,13 +7346,6 @@
   <p:clrMapOvr>
     <a:masterClrMapping/>
   </p:clrMapOvr>
-  <p:timing>
-    <p:tnLst>
-      <p:par>
-        <p:cTn xmlns:p14="http://schemas.microsoft.com/office/powerpoint/2010/main" id="1" dur="indefinite" restart="never" nodeType="tmRoot"/>
-      </p:par>
-    </p:tnLst>
-  </p:timing>
 </p:sld>
 </file>
 
@@ -7607,12 +7427,8 @@
               <a:buNone/>
             </a:pPr>
             <a:r>
-              <a:rPr lang="en-US" sz="1800" dirty="0" smtClean="0"/>
-              <a:t>• </a:t>
-            </a:r>
-            <a:r>
               <a:rPr lang="en-US" sz="1800" dirty="0"/>
-              <a:t>Ant </a:t>
+              <a:t>• Ant </a:t>
             </a:r>
             <a:r>
               <a:rPr lang="en-US" sz="1800" u="sng" dirty="0" err="1"/>
@@ -7648,22 +7464,16 @@
               <a:rPr lang="en-US" sz="1800" dirty="0">
                 <a:hlinkClick r:id="rId3"/>
               </a:rPr>
-              <a:t>http://www.bulkrenameutility.co.uk</a:t>
-            </a:r>
-            <a:r>
-              <a:rPr lang="en-US" sz="1800" dirty="0" smtClean="0">
-                <a:hlinkClick r:id="rId3"/>
-              </a:rPr>
-              <a:t>/</a:t>
-            </a:r>
-            <a:endParaRPr lang="en-US" sz="1800" dirty="0" smtClean="0"/>
+              <a:t>http://www.bulkrenameutility.co.uk/</a:t>
+            </a:r>
+            <a:endParaRPr lang="en-US" sz="1800" dirty="0"/>
           </a:p>
           <a:p>
             <a:pPr marL="400050" lvl="1" indent="0">
               <a:buNone/>
             </a:pPr>
             <a:r>
-              <a:rPr lang="en-US" sz="1800" dirty="0" smtClean="0"/>
+              <a:rPr lang="en-US" sz="1800" dirty="0"/>
               <a:t>• </a:t>
             </a:r>
             <a:r>
@@ -7683,14 +7493,14 @@
               <a:t>/products/</a:t>
             </a:r>
             <a:r>
-              <a:rPr lang="en-US" sz="1800" dirty="0" err="1" smtClean="0"/>
+              <a:rPr lang="en-US" sz="1800" dirty="0" err="1"/>
               <a:t>psrenamer.html</a:t>
             </a:r>
-            <a:endParaRPr lang="en-US" sz="1800" dirty="0" smtClean="0"/>
-          </a:p>
-          <a:p>
-            <a:r>
-              <a:rPr lang="en-US" sz="2000" dirty="0" smtClean="0"/>
+            <a:endParaRPr lang="en-US" sz="1800" dirty="0"/>
+          </a:p>
+          <a:p>
+            <a:r>
+              <a:rPr lang="en-US" sz="2000" dirty="0"/>
               <a:t>Mac:</a:t>
             </a:r>
           </a:p>
@@ -7699,7 +7509,7 @@
               <a:buNone/>
             </a:pPr>
             <a:r>
-              <a:rPr lang="en-US" sz="1800" dirty="0" smtClean="0"/>
+              <a:rPr lang="en-US" sz="1800" dirty="0"/>
               <a:t>• </a:t>
             </a:r>
             <a:r>
@@ -7768,10 +7578,9 @@
           </a:p>
           <a:p>
             <a:r>
-              <a:rPr lang="en-US" sz="2000" dirty="0" smtClean="0"/>
+              <a:rPr lang="en-US" sz="2000" dirty="0"/>
               <a:t>Linux/Unix:</a:t>
             </a:r>
-            <a:endParaRPr lang="en-US" sz="2000" dirty="0"/>
           </a:p>
           <a:p>
             <a:pPr marL="400050" lvl="1" indent="0">
@@ -7785,22 +7594,16 @@
               <a:rPr lang="en-US" sz="1800" dirty="0">
                 <a:hlinkClick r:id="rId4"/>
               </a:rPr>
-              <a:t>http://www.nongnu.org/gcmd</a:t>
-            </a:r>
-            <a:r>
-              <a:rPr lang="en-US" sz="1800" dirty="0" smtClean="0">
-                <a:hlinkClick r:id="rId4"/>
-              </a:rPr>
-              <a:t>/</a:t>
-            </a:r>
-            <a:endParaRPr lang="en-US" sz="1800" dirty="0" smtClean="0"/>
+              <a:t>http://www.nongnu.org/gcmd/</a:t>
+            </a:r>
+            <a:endParaRPr lang="en-US" sz="1800" dirty="0"/>
           </a:p>
           <a:p>
             <a:pPr marL="400050" lvl="1" indent="0">
               <a:buNone/>
             </a:pPr>
             <a:r>
-              <a:rPr lang="en-US" sz="1800" dirty="0" smtClean="0"/>
+              <a:rPr lang="en-US" sz="1800" dirty="0"/>
               <a:t>• </a:t>
             </a:r>
             <a:r>
@@ -7815,71 +7618,45 @@
               <a:rPr lang="en-US" sz="1800" dirty="0">
                 <a:hlinkClick r:id="rId5"/>
               </a:rPr>
-              <a:t>http://www.powersurgepub.com/products/</a:t>
-            </a:r>
-            <a:r>
-              <a:rPr lang="en-US" sz="1800" dirty="0" smtClean="0">
-                <a:hlinkClick r:id="rId5"/>
-              </a:rPr>
-              <a:t>psrenamer.html</a:t>
-            </a:r>
-            <a:endParaRPr lang="en-US" sz="1800" dirty="0" smtClean="0"/>
+              <a:t>http://www.powersurgepub.com/products/psrenamer.html</a:t>
+            </a:r>
+            <a:endParaRPr lang="en-US" sz="1800" dirty="0"/>
           </a:p>
           <a:p>
             <a:pPr marL="400050" lvl="1" indent="0">
               <a:buNone/>
             </a:pPr>
             <a:r>
-              <a:rPr lang="en-US" sz="1800" dirty="0" smtClean="0"/>
-              <a:t>• </a:t>
-            </a:r>
-            <a:r>
               <a:rPr lang="en-US" sz="1800" dirty="0"/>
-              <a:t>U</a:t>
-            </a:r>
-            <a:r>
-              <a:rPr lang="en-US" sz="1800" dirty="0" smtClean="0"/>
-              <a:t>se </a:t>
-            </a:r>
-            <a:r>
-              <a:rPr lang="en-US" sz="1800" i="1" u="sng" dirty="0" err="1" smtClean="0"/>
+              <a:t>• Use </a:t>
+            </a:r>
+            <a:r>
+              <a:rPr lang="en-US" sz="1800" i="1" u="sng" dirty="0" err="1"/>
               <a:t>grep</a:t>
             </a:r>
             <a:r>
-              <a:rPr lang="en-US" sz="1800" i="1" u="sng" dirty="0" smtClean="0"/>
+              <a:rPr lang="en-US" sz="1800" i="1" u="sng" dirty="0"/>
               <a:t>, </a:t>
             </a:r>
             <a:r>
-              <a:rPr lang="en-US" sz="1800" i="1" u="sng" dirty="0" err="1" smtClean="0"/>
+              <a:rPr lang="en-US" sz="1800" i="1" u="sng" dirty="0" err="1"/>
               <a:t>sed</a:t>
+            </a:r>
+            <a:r>
+              <a:rPr lang="en-US" sz="1800" i="1" u="sng" dirty="0"/>
+              <a:t> and </a:t>
+            </a:r>
+            <a:r>
+              <a:rPr lang="en-US" sz="1800" i="1" u="sng" dirty="0" err="1"/>
+              <a:t>awk</a:t>
             </a:r>
             <a:r>
               <a:rPr lang="en-US" sz="1800" i="1" u="sng" dirty="0"/>
               <a:t> </a:t>
             </a:r>
             <a:r>
-              <a:rPr lang="en-US" sz="1800" i="1" u="sng" dirty="0" smtClean="0"/>
-              <a:t>and </a:t>
-            </a:r>
-            <a:r>
-              <a:rPr lang="en-US" sz="1800" i="1" u="sng" dirty="0" err="1" smtClean="0"/>
-              <a:t>awk</a:t>
-            </a:r>
-            <a:r>
-              <a:rPr lang="en-US" sz="1800" i="1" u="sng" dirty="0" smtClean="0"/>
-              <a:t> </a:t>
-            </a:r>
-            <a:r>
-              <a:rPr lang="en-US" sz="1800" u="sng" dirty="0" smtClean="0"/>
-              <a:t>to </a:t>
-            </a:r>
-            <a:r>
               <a:rPr lang="en-US" sz="1800" u="sng" dirty="0"/>
-              <a:t>search for </a:t>
-            </a:r>
-            <a:r>
-              <a:rPr lang="en-US" sz="1800" u="sng" dirty="0" smtClean="0"/>
-              <a:t>and change</a:t>
+              <a:t>to search for and change</a:t>
             </a:r>
             <a:endParaRPr lang="en-US" sz="1800" u="sng" dirty="0">
               <a:solidFill>
@@ -7899,13 +7676,6 @@
   <p:clrMapOvr>
     <a:masterClrMapping/>
   </p:clrMapOvr>
-  <p:timing>
-    <p:tnLst>
-      <p:par>
-        <p:cTn xmlns:p14="http://schemas.microsoft.com/office/powerpoint/2010/main" id="1" dur="indefinite" restart="never" nodeType="tmRoot"/>
-      </p:par>
-    </p:tnLst>
-  </p:timing>
 </p:sld>
 </file>
 
@@ -8135,15 +7905,7 @@
           <a:p>
             <a:r>
               <a:rPr lang="en-US" sz="2400" dirty="0"/>
-              <a:t>Directory top-level folders should include the project title, unique identifier, and date (year), but the files themselves </a:t>
-            </a:r>
-            <a:r>
-              <a:rPr lang="en-US" sz="2400" dirty="0" smtClean="0"/>
-              <a:t>should </a:t>
-            </a:r>
-            <a:r>
-              <a:rPr lang="en-US" sz="2400" dirty="0"/>
-              <a:t>be well-described independent of the directory structure.</a:t>
+              <a:t>Directory top-level folders should include the project title, unique identifier, and date (year), but the files themselves should be well-described independent of the directory structure.</a:t>
             </a:r>
           </a:p>
           <a:p>
@@ -8166,30 +7928,29 @@
               <a:t>Dry lab: </a:t>
             </a:r>
             <a:r>
-              <a:rPr lang="en-US" sz="2000" dirty="0" err="1" smtClean="0"/>
+              <a:rPr lang="en-US" sz="2000" dirty="0" err="1"/>
               <a:t>Git</a:t>
             </a:r>
             <a:r>
-              <a:rPr lang="en-US" sz="2000" dirty="0" smtClean="0"/>
+              <a:rPr lang="en-US" sz="2000" dirty="0"/>
               <a:t> (</a:t>
             </a:r>
             <a:r>
-              <a:rPr lang="en-US" sz="2000" dirty="0" err="1" smtClean="0"/>
+              <a:rPr lang="en-US" sz="2000" dirty="0" err="1"/>
               <a:t>GitHub</a:t>
             </a:r>
             <a:r>
-              <a:rPr lang="en-US" sz="2000" dirty="0" smtClean="0"/>
+              <a:rPr lang="en-US" sz="2000" dirty="0"/>
               <a:t>/</a:t>
             </a:r>
             <a:r>
-              <a:rPr lang="en-US" sz="2000" dirty="0" err="1" smtClean="0"/>
+              <a:rPr lang="en-US" sz="2000" dirty="0" err="1"/>
               <a:t>GitLab</a:t>
             </a:r>
             <a:r>
-              <a:rPr lang="en-US" sz="2000" dirty="0" smtClean="0"/>
+              <a:rPr lang="en-US" sz="2000" dirty="0"/>
               <a:t>), Subversion (SVN)</a:t>
             </a:r>
-            <a:endParaRPr lang="en-US" sz="2000" dirty="0"/>
           </a:p>
           <a:p>
             <a:pPr marL="0" indent="0">
@@ -8219,13 +7980,6 @@
   <p:clrMapOvr>
     <a:masterClrMapping/>
   </p:clrMapOvr>
-  <p:timing>
-    <p:tnLst>
-      <p:par>
-        <p:cTn xmlns:p14="http://schemas.microsoft.com/office/powerpoint/2010/main" id="1" dur="indefinite" restart="never" nodeType="tmRoot"/>
-      </p:par>
-    </p:tnLst>
-  </p:timing>
 </p:sld>
 </file>
 
@@ -8315,13 +8069,6 @@
   <p:clrMapOvr>
     <a:masterClrMapping/>
   </p:clrMapOvr>
-  <p:timing>
-    <p:tnLst>
-      <p:par>
-        <p:cTn xmlns:p14="http://schemas.microsoft.com/office/powerpoint/2010/main" id="1" dur="indefinite" restart="never" nodeType="tmRoot"/>
-      </p:par>
-    </p:tnLst>
-  </p:timing>
 </p:sld>
 </file>
 
@@ -8481,13 +8228,6 @@
   <p:clrMapOvr>
     <a:masterClrMapping/>
   </p:clrMapOvr>
-  <p:timing>
-    <p:tnLst>
-      <p:par>
-        <p:cTn xmlns:p14="http://schemas.microsoft.com/office/powerpoint/2010/main" id="1" dur="indefinite" restart="never" nodeType="tmRoot"/>
-      </p:par>
-    </p:tnLst>
-  </p:timing>
 </p:sld>
 </file>
 
@@ -8571,13 +8311,6 @@
   <p:clrMapOvr>
     <a:masterClrMapping/>
   </p:clrMapOvr>
-  <p:timing>
-    <p:tnLst>
-      <p:par>
-        <p:cTn xmlns:p14="http://schemas.microsoft.com/office/powerpoint/2010/main" id="1" dur="indefinite" restart="never" nodeType="tmRoot"/>
-      </p:par>
-    </p:tnLst>
-  </p:timing>
 </p:sld>
 </file>
 
@@ -8667,13 +8400,6 @@
   <p:clrMapOvr>
     <a:masterClrMapping/>
   </p:clrMapOvr>
-  <p:timing>
-    <p:tnLst>
-      <p:par>
-        <p:cTn xmlns:p14="http://schemas.microsoft.com/office/powerpoint/2010/main" id="1" dur="indefinite" restart="never" nodeType="tmRoot"/>
-      </p:par>
-    </p:tnLst>
-  </p:timing>
 </p:sld>
 </file>
 
@@ -8699,7 +8425,7 @@
           <p:cNvPr id="11" name="Picture 10">
             <a:extLst>
               <a:ext uri="{FF2B5EF4-FFF2-40B4-BE49-F238E27FC236}">
-                <a16:creationId xmlns:a16="http://schemas.microsoft.com/office/drawing/2014/main" xmlns="" id="{E6F1BE2A-EC94-9E4A-AC59-67474BFF6EA3}"/>
+                <a16:creationId xmlns:a16="http://schemas.microsoft.com/office/drawing/2014/main" id="{E6F1BE2A-EC94-9E4A-AC59-67474BFF6EA3}"/>
               </a:ext>
             </a:extLst>
           </p:cNvPr>
@@ -8734,13 +8460,6 @@
   <p:clrMapOvr>
     <a:masterClrMapping/>
   </p:clrMapOvr>
-  <p:timing>
-    <p:tnLst>
-      <p:par>
-        <p:cTn xmlns:p14="http://schemas.microsoft.com/office/powerpoint/2010/main" id="1" dur="indefinite" restart="never" nodeType="tmRoot"/>
-      </p:par>
-    </p:tnLst>
-  </p:timing>
 </p:sld>
 </file>
 
@@ -8761,93 +8480,99 @@
           <a:chExt cx="0" cy="0"/>
         </a:xfrm>
       </p:grpSpPr>
-      <p:sp>
-        <p:nvSpPr>
-          <p:cNvPr id="2" name="Title 1"/>
-          <p:cNvSpPr>
-            <a:spLocks noGrp="1"/>
-          </p:cNvSpPr>
-          <p:nvPr>
-            <p:ph type="title"/>
-          </p:nvPr>
-        </p:nvSpPr>
-        <p:spPr/>
-        <p:txBody>
-          <a:bodyPr>
-            <a:normAutofit/>
-          </a:bodyPr>
-          <a:lstStyle/>
-          <a:p>
-            <a:pPr algn="l"/>
-            <a:r>
-              <a:rPr lang="en-US" sz="3200" u="sng" dirty="0">
-                <a:solidFill>
-                  <a:schemeClr val="tx2"/>
-                </a:solidFill>
-              </a:rPr>
-              <a:t>Small Group Discussion									</a:t>
-            </a:r>
-          </a:p>
-        </p:txBody>
-      </p:sp>
-      <p:sp>
-        <p:nvSpPr>
-          <p:cNvPr id="3" name="Content Placeholder 2"/>
-          <p:cNvSpPr>
-            <a:spLocks noGrp="1"/>
-          </p:cNvSpPr>
-          <p:nvPr>
-            <p:ph idx="1"/>
-          </p:nvPr>
-        </p:nvSpPr>
+      <p:pic>
+        <p:nvPicPr>
+          <p:cNvPr id="5" name="Picture 4">
+            <a:extLst>
+              <a:ext uri="{FF2B5EF4-FFF2-40B4-BE49-F238E27FC236}">
+                <a16:creationId xmlns:a16="http://schemas.microsoft.com/office/drawing/2014/main" id="{5009BF83-60DA-5B43-BCC7-CD95733C2ABD}"/>
+              </a:ext>
+            </a:extLst>
+          </p:cNvPr>
+          <p:cNvPicPr>
+            <a:picLocks noChangeAspect="1"/>
+          </p:cNvPicPr>
+          <p:nvPr/>
+        </p:nvPicPr>
+        <p:blipFill>
+          <a:blip r:embed="rId2"/>
+          <a:stretch>
+            <a:fillRect/>
+          </a:stretch>
+        </p:blipFill>
         <p:spPr>
           <a:xfrm>
-            <a:off x="457200" y="1600200"/>
-            <a:ext cx="8229600" cy="4734068"/>
+            <a:off x="0" y="996950"/>
+            <a:ext cx="9144000" cy="4864100"/>
           </a:xfrm>
+          <a:prstGeom prst="rect">
+            <a:avLst/>
+          </a:prstGeom>
         </p:spPr>
-        <p:txBody>
-          <a:bodyPr>
-            <a:normAutofit/>
-          </a:bodyPr>
-          <a:lstStyle/>
-          <a:p>
-            <a:r>
-              <a:rPr lang="en-US" sz="2400" dirty="0"/>
-              <a:t>What sort of structure(s) do you currently use?</a:t>
-            </a:r>
-          </a:p>
-          <a:p>
-            <a:r>
-              <a:rPr lang="en-US" sz="2400" dirty="0"/>
-              <a:t>What do you see as the key advantages and disadvantages of the different types of system?</a:t>
-            </a:r>
-          </a:p>
-          <a:p>
-            <a:r>
-              <a:rPr lang="en-US" sz="2400" dirty="0"/>
-              <a:t>Are there specific tasks one sort of system seems particularly suitable for? How does this apply to your research project?</a:t>
-            </a:r>
+      </p:pic>
+      <p:sp>
+        <p:nvSpPr>
+          <p:cNvPr id="7" name="Rectangle 6">
+            <a:extLst>
+              <a:ext uri="{FF2B5EF4-FFF2-40B4-BE49-F238E27FC236}">
+                <a16:creationId xmlns:a16="http://schemas.microsoft.com/office/drawing/2014/main" id="{FB444285-C464-C545-8B1B-E3F4DAEC3E03}"/>
+              </a:ext>
+            </a:extLst>
+          </p:cNvPr>
+          <p:cNvSpPr/>
+          <p:nvPr/>
+        </p:nvSpPr>
+        <p:spPr>
+          <a:xfrm>
+            <a:off x="0" y="1955800"/>
+            <a:ext cx="508000" cy="114300"/>
+          </a:xfrm>
+          <a:prstGeom prst="rect">
+            <a:avLst/>
+          </a:prstGeom>
+          <a:solidFill>
+            <a:schemeClr val="bg1"/>
+          </a:solidFill>
+          <a:ln>
+            <a:solidFill>
+              <a:schemeClr val="bg1"/>
+            </a:solidFill>
+          </a:ln>
+          <a:effectLst/>
+        </p:spPr>
+        <p:style>
+          <a:lnRef idx="1">
+            <a:schemeClr val="accent1"/>
+          </a:lnRef>
+          <a:fillRef idx="3">
+            <a:schemeClr val="accent1"/>
+          </a:fillRef>
+          <a:effectRef idx="2">
+            <a:schemeClr val="accent1"/>
+          </a:effectRef>
+          <a:fontRef idx="minor">
+            <a:schemeClr val="lt1"/>
+          </a:fontRef>
+        </p:style>
+        <p:txBody>
+          <a:bodyPr rtlCol="0" anchor="ctr"/>
+          <a:lstStyle/>
+          <a:p>
+            <a:pPr algn="ctr"/>
+            <a:endParaRPr lang="en-US"/>
           </a:p>
         </p:txBody>
       </p:sp>
     </p:spTree>
     <p:extLst>
       <p:ext uri="{BB962C8B-B14F-4D97-AF65-F5344CB8AC3E}">
-        <p14:creationId xmlns:p14="http://schemas.microsoft.com/office/powerpoint/2010/main" val="3580087969"/>
+        <p14:creationId xmlns:p14="http://schemas.microsoft.com/office/powerpoint/2010/main" val="932812651"/>
       </p:ext>
     </p:extLst>
   </p:cSld>
   <p:clrMapOvr>
     <a:masterClrMapping/>
   </p:clrMapOvr>
-  <p:timing>
-    <p:tnLst>
-      <p:par>
-        <p:cTn xmlns:p14="http://schemas.microsoft.com/office/powerpoint/2010/main" id="1" dur="indefinite" restart="never" nodeType="tmRoot"/>
-      </p:par>
-    </p:tnLst>
-  </p:timing>
 </p:sld>
 </file>
 
@@ -8887,20 +8612,12 @@
           <a:p>
             <a:pPr algn="l"/>
             <a:r>
-              <a:rPr lang="en-US" sz="3200" u="sng" dirty="0" smtClean="0">
+              <a:rPr lang="en-US" sz="3200" u="sng" dirty="0">
                 <a:solidFill>
                   <a:schemeClr val="tx2"/>
                 </a:solidFill>
               </a:rPr>
-              <a:t>Introduction</a:t>
-            </a:r>
-            <a:r>
-              <a:rPr lang="en-US" sz="3200" u="sng" dirty="0">
-                <a:solidFill>
-                  <a:schemeClr val="tx2"/>
-                </a:solidFill>
-              </a:rPr>
-              <a:t>										</a:t>
+              <a:t>Introduction										</a:t>
             </a:r>
           </a:p>
         </p:txBody>
@@ -8944,39 +8661,30 @@
           <a:p>
             <a:pPr marL="857250" lvl="1" indent="-457200"/>
             <a:r>
-              <a:rPr lang="en-US" dirty="0" smtClean="0"/>
-              <a:t>File </a:t>
-            </a:r>
-            <a:r>
-              <a:rPr lang="en-US" dirty="0"/>
-              <a:t>structures</a:t>
+              <a:rPr lang="en-US" dirty="0"/>
+              <a:t>File structures</a:t>
             </a:r>
           </a:p>
           <a:p>
             <a:pPr marL="857250" lvl="1" indent="-457200"/>
             <a:r>
-              <a:rPr lang="en-US" dirty="0" smtClean="0"/>
-              <a:t>File </a:t>
-            </a:r>
-            <a:r>
-              <a:rPr lang="en-US" dirty="0"/>
-              <a:t>naming</a:t>
+              <a:rPr lang="en-US" dirty="0"/>
+              <a:t>File naming</a:t>
             </a:r>
           </a:p>
           <a:p>
             <a:pPr marL="857250" lvl="1" indent="-457200"/>
             <a:r>
-              <a:rPr lang="en-US" dirty="0" smtClean="0"/>
+              <a:rPr lang="en-US" dirty="0"/>
               <a:t>Version control</a:t>
             </a:r>
           </a:p>
           <a:p>
             <a:pPr marL="857250" lvl="1" indent="-457200"/>
             <a:r>
-              <a:rPr lang="en-US" dirty="0" smtClean="0"/>
+              <a:rPr lang="en-US" dirty="0"/>
               <a:t>Storage</a:t>
             </a:r>
-            <a:endParaRPr lang="en-US" dirty="0"/>
           </a:p>
           <a:p>
             <a:pPr marL="0" indent="0">
@@ -9005,13 +8713,6 @@
   <p:clrMapOvr>
     <a:masterClrMapping/>
   </p:clrMapOvr>
-  <p:timing>
-    <p:tnLst>
-      <p:par>
-        <p:cTn xmlns:p14="http://schemas.microsoft.com/office/powerpoint/2010/main" id="1" dur="indefinite" restart="never" nodeType="tmRoot"/>
-      </p:par>
-    </p:tnLst>
-  </p:timing>
 </p:sld>
 </file>
 
@@ -9152,13 +8853,6 @@
   <p:clrMapOvr>
     <a:masterClrMapping/>
   </p:clrMapOvr>
-  <p:timing>
-    <p:tnLst>
-      <p:par>
-        <p:cTn xmlns:p14="http://schemas.microsoft.com/office/powerpoint/2010/main" id="1" dur="indefinite" restart="never" nodeType="tmRoot"/>
-      </p:par>
-    </p:tnLst>
-  </p:timing>
 </p:sld>
 </file>
 
@@ -9283,13 +8977,6 @@
   <p:clrMapOvr>
     <a:masterClrMapping/>
   </p:clrMapOvr>
-  <p:timing>
-    <p:tnLst>
-      <p:par>
-        <p:cTn xmlns:p14="http://schemas.microsoft.com/office/powerpoint/2010/main" id="1" dur="indefinite" restart="never" nodeType="tmRoot"/>
-      </p:par>
-    </p:tnLst>
-  </p:timing>
 </p:sld>
 </file>
 
@@ -9414,13 +9101,6 @@
   <p:clrMapOvr>
     <a:masterClrMapping/>
   </p:clrMapOvr>
-  <p:timing>
-    <p:tnLst>
-      <p:par>
-        <p:cTn xmlns:p14="http://schemas.microsoft.com/office/powerpoint/2010/main" id="1" dur="indefinite" restart="never" nodeType="tmRoot"/>
-      </p:par>
-    </p:tnLst>
-  </p:timing>
 </p:sld>
 </file>
 
@@ -9881,13 +9561,6 @@
   <p:clrMapOvr>
     <a:masterClrMapping/>
   </p:clrMapOvr>
-  <p:timing>
-    <p:tnLst>
-      <p:par>
-        <p:cTn xmlns:p14="http://schemas.microsoft.com/office/powerpoint/2010/main" id="1" dur="indefinite" restart="never" nodeType="tmRoot"/>
-      </p:par>
-    </p:tnLst>
-  </p:timing>
 </p:sld>
 </file>
 
@@ -10011,13 +9684,6 @@
   <p:clrMapOvr>
     <a:masterClrMapping/>
   </p:clrMapOvr>
-  <p:timing>
-    <p:tnLst>
-      <p:par>
-        <p:cTn xmlns:p14="http://schemas.microsoft.com/office/powerpoint/2010/main" id="1" dur="indefinite" restart="never" nodeType="tmRoot"/>
-      </p:par>
-    </p:tnLst>
-  </p:timing>
 </p:sld>
 </file>
 
@@ -10113,23 +9779,7 @@
                   <a:srgbClr val="0000FF"/>
                 </a:solidFill>
               </a:rPr>
-              <a:t> by UK Data Archive for long term preservation for </a:t>
-            </a:r>
-            <a:r>
-              <a:rPr lang="en-US" sz="2400" u="sng" dirty="0" err="1">
-                <a:solidFill>
-                  <a:srgbClr val="0000FF"/>
-                </a:solidFill>
-              </a:rPr>
-              <a:t>rsearch</a:t>
-            </a:r>
-            <a:r>
-              <a:rPr lang="en-US" sz="2400" u="sng" dirty="0">
-                <a:solidFill>
-                  <a:srgbClr val="0000FF"/>
-                </a:solidFill>
-              </a:rPr>
-              <a:t> data</a:t>
+              <a:t> by UK Data Archive for long term preservation for research data</a:t>
             </a:r>
           </a:p>
         </p:txBody>
@@ -10144,13 +9794,6 @@
   <p:clrMapOvr>
     <a:masterClrMapping/>
   </p:clrMapOvr>
-  <p:timing>
-    <p:tnLst>
-      <p:par>
-        <p:cTn xmlns:p14="http://schemas.microsoft.com/office/powerpoint/2010/main" id="1" dur="indefinite" restart="never" nodeType="tmRoot"/>
-      </p:par>
-    </p:tnLst>
-  </p:timing>
 </p:sld>
 </file>
 
@@ -10211,13 +9854,6 @@
   <p:clrMapOvr>
     <a:masterClrMapping/>
   </p:clrMapOvr>
-  <p:timing>
-    <p:tnLst>
-      <p:par>
-        <p:cTn xmlns:p14="http://schemas.microsoft.com/office/powerpoint/2010/main" id="1" dur="indefinite" restart="never" nodeType="tmRoot"/>
-      </p:par>
-    </p:tnLst>
-  </p:timing>
 </p:sld>
 </file>
 

</xml_diff>